<commit_message>
Refactored the management of pics.
</commit_message>
<xml_diff>
--- a/api/overview/img/programming-model.pptx
+++ b/api/overview/img/programming-model.pptx
@@ -7,6 +7,7 @@
   <p:sldIdLst>
     <p:sldId id="256" r:id="rId2"/>
     <p:sldId id="257" r:id="rId3"/>
+    <p:sldId id="258" r:id="rId4"/>
   </p:sldIdLst>
   <p:sldSz cx="9144000" cy="6858000" type="screen4x3"/>
   <p:notesSz cx="6858000" cy="9144000"/>
@@ -4590,6 +4591,1014 @@
     <p:extLst>
       <p:ext uri="{BB962C8B-B14F-4D97-AF65-F5344CB8AC3E}">
         <p14:creationId xmlns:p14="http://schemas.microsoft.com/office/powerpoint/2010/main" val="956255044"/>
+      </p:ext>
+    </p:extLst>
+  </p:cSld>
+  <p:clrMapOvr>
+    <a:masterClrMapping/>
+  </p:clrMapOvr>
+</p:sld>
+</file>
+
+<file path=ppt/slides/slide3.xml><?xml version="1.0" encoding="utf-8"?>
+<p:sld xmlns:a="http://schemas.openxmlformats.org/drawingml/2006/main" xmlns:r="http://schemas.openxmlformats.org/officeDocument/2006/relationships" xmlns:p="http://schemas.openxmlformats.org/presentationml/2006/main">
+  <p:cSld>
+    <p:spTree>
+      <p:nvGrpSpPr>
+        <p:cNvPr id="1" name=""/>
+        <p:cNvGrpSpPr/>
+        <p:nvPr/>
+      </p:nvGrpSpPr>
+      <p:grpSpPr>
+        <a:xfrm>
+          <a:off x="0" y="0"/>
+          <a:ext cx="0" cy="0"/>
+          <a:chOff x="0" y="0"/>
+          <a:chExt cx="0" cy="0"/>
+        </a:xfrm>
+      </p:grpSpPr>
+      <p:sp>
+        <p:nvSpPr>
+          <p:cNvPr id="10" name="椭圆 9"/>
+          <p:cNvSpPr/>
+          <p:nvPr/>
+        </p:nvSpPr>
+        <p:spPr>
+          <a:xfrm>
+            <a:off x="4644770" y="1572882"/>
+            <a:ext cx="4177250" cy="2088943"/>
+          </a:xfrm>
+          <a:prstGeom prst="ellipse">
+            <a:avLst/>
+          </a:prstGeom>
+          <a:ln>
+            <a:prstDash val="solid"/>
+          </a:ln>
+        </p:spPr>
+        <p:style>
+          <a:lnRef idx="2">
+            <a:schemeClr val="dk1"/>
+          </a:lnRef>
+          <a:fillRef idx="1">
+            <a:schemeClr val="lt1"/>
+          </a:fillRef>
+          <a:effectRef idx="0">
+            <a:schemeClr val="dk1"/>
+          </a:effectRef>
+          <a:fontRef idx="minor">
+            <a:schemeClr val="dk1"/>
+          </a:fontRef>
+        </p:style>
+        <p:txBody>
+          <a:bodyPr rtlCol="0" anchor="ctr"/>
+          <a:lstStyle/>
+          <a:p>
+            <a:pPr algn="ctr"/>
+            <a:endParaRPr kumimoji="1" lang="zh-CN" altLang="en-US">
+              <a:ln>
+                <a:solidFill>
+                  <a:schemeClr val="tx1"/>
+                </a:solidFill>
+                <a:prstDash val="dash"/>
+              </a:ln>
+            </a:endParaRPr>
+          </a:p>
+        </p:txBody>
+      </p:sp>
+      <p:sp>
+        <p:nvSpPr>
+          <p:cNvPr id="8" name="椭圆 7"/>
+          <p:cNvSpPr/>
+          <p:nvPr/>
+        </p:nvSpPr>
+        <p:spPr>
+          <a:xfrm>
+            <a:off x="2665177" y="4528829"/>
+            <a:ext cx="4695229" cy="2088943"/>
+          </a:xfrm>
+          <a:prstGeom prst="ellipse">
+            <a:avLst/>
+          </a:prstGeom>
+          <a:ln>
+            <a:prstDash val="solid"/>
+          </a:ln>
+        </p:spPr>
+        <p:style>
+          <a:lnRef idx="2">
+            <a:schemeClr val="dk1"/>
+          </a:lnRef>
+          <a:fillRef idx="1">
+            <a:schemeClr val="lt1"/>
+          </a:fillRef>
+          <a:effectRef idx="0">
+            <a:schemeClr val="dk1"/>
+          </a:effectRef>
+          <a:fontRef idx="minor">
+            <a:schemeClr val="dk1"/>
+          </a:fontRef>
+        </p:style>
+        <p:txBody>
+          <a:bodyPr rtlCol="0" anchor="ctr"/>
+          <a:lstStyle/>
+          <a:p>
+            <a:pPr algn="ctr"/>
+            <a:endParaRPr kumimoji="1" lang="zh-CN" altLang="en-US">
+              <a:ln>
+                <a:solidFill>
+                  <a:schemeClr val="tx1"/>
+                </a:solidFill>
+                <a:prstDash val="dash"/>
+              </a:ln>
+            </a:endParaRPr>
+          </a:p>
+        </p:txBody>
+      </p:sp>
+      <p:sp>
+        <p:nvSpPr>
+          <p:cNvPr id="4" name="云形 3"/>
+          <p:cNvSpPr/>
+          <p:nvPr/>
+        </p:nvSpPr>
+        <p:spPr>
+          <a:xfrm>
+            <a:off x="303463" y="1614949"/>
+            <a:ext cx="3391927" cy="2004809"/>
+          </a:xfrm>
+          <a:prstGeom prst="cloud">
+            <a:avLst/>
+          </a:prstGeom>
+        </p:spPr>
+        <p:style>
+          <a:lnRef idx="2">
+            <a:schemeClr val="dk1"/>
+          </a:lnRef>
+          <a:fillRef idx="1">
+            <a:schemeClr val="lt1"/>
+          </a:fillRef>
+          <a:effectRef idx="0">
+            <a:schemeClr val="dk1"/>
+          </a:effectRef>
+          <a:fontRef idx="minor">
+            <a:schemeClr val="dk1"/>
+          </a:fontRef>
+        </p:style>
+        <p:txBody>
+          <a:bodyPr rtlCol="0" anchor="ctr"/>
+          <a:lstStyle/>
+          <a:p>
+            <a:pPr algn="ctr"/>
+            <a:r>
+              <a:rPr kumimoji="1" lang="zh-CN" altLang="en-US" dirty="0" smtClean="0">
+                <a:latin typeface="Hei"/>
+                <a:ea typeface="Hei"/>
+                <a:cs typeface="Hei"/>
+              </a:rPr>
+              <a:t>云存储服务</a:t>
+            </a:r>
+            <a:endParaRPr kumimoji="1" lang="zh-CN" altLang="en-US" dirty="0">
+              <a:latin typeface="Hei"/>
+              <a:ea typeface="Hei"/>
+              <a:cs typeface="Hei"/>
+            </a:endParaRPr>
+          </a:p>
+        </p:txBody>
+      </p:sp>
+      <p:pic>
+        <p:nvPicPr>
+          <p:cNvPr id="6" name="图片 5"/>
+          <p:cNvPicPr>
+            <a:picLocks noChangeAspect="1"/>
+          </p:cNvPicPr>
+          <p:nvPr/>
+        </p:nvPicPr>
+        <p:blipFill>
+          <a:blip r:embed="rId2" cstate="email">
+            <a:extLst>
+              <a:ext uri="{28A0092B-C50C-407E-A947-70E740481C1C}">
+                <a14:useLocalDpi xmlns:a14="http://schemas.microsoft.com/office/drawing/2010/main"/>
+              </a:ext>
+            </a:extLst>
+          </a:blip>
+          <a:stretch>
+            <a:fillRect/>
+          </a:stretch>
+        </p:blipFill>
+        <p:spPr>
+          <a:xfrm>
+            <a:off x="3603866" y="5010724"/>
+            <a:ext cx="1040904" cy="919465"/>
+          </a:xfrm>
+          <a:prstGeom prst="rect">
+            <a:avLst/>
+          </a:prstGeom>
+        </p:spPr>
+      </p:pic>
+      <p:pic>
+        <p:nvPicPr>
+          <p:cNvPr id="7" name="图片 6"/>
+          <p:cNvPicPr>
+            <a:picLocks noChangeAspect="1"/>
+          </p:cNvPicPr>
+          <p:nvPr/>
+        </p:nvPicPr>
+        <p:blipFill>
+          <a:blip r:embed="rId3"/>
+          <a:stretch>
+            <a:fillRect/>
+          </a:stretch>
+        </p:blipFill>
+        <p:spPr>
+          <a:xfrm>
+            <a:off x="5535557" y="2068038"/>
+            <a:ext cx="1224136" cy="1224136"/>
+          </a:xfrm>
+          <a:prstGeom prst="rect">
+            <a:avLst/>
+          </a:prstGeom>
+        </p:spPr>
+      </p:pic>
+      <p:pic>
+        <p:nvPicPr>
+          <p:cNvPr id="11" name="图片 10"/>
+          <p:cNvPicPr>
+            <a:picLocks noChangeAspect="1"/>
+          </p:cNvPicPr>
+          <p:nvPr/>
+        </p:nvPicPr>
+        <p:blipFill>
+          <a:blip r:embed="rId3"/>
+          <a:stretch>
+            <a:fillRect/>
+          </a:stretch>
+        </p:blipFill>
+        <p:spPr>
+          <a:xfrm>
+            <a:off x="7048459" y="1848303"/>
+            <a:ext cx="854486" cy="854486"/>
+          </a:xfrm>
+          <a:prstGeom prst="rect">
+            <a:avLst/>
+          </a:prstGeom>
+        </p:spPr>
+      </p:pic>
+      <p:cxnSp>
+        <p:nvCxnSpPr>
+          <p:cNvPr id="13" name="直线箭头连接符 12"/>
+          <p:cNvCxnSpPr/>
+          <p:nvPr/>
+        </p:nvCxnSpPr>
+        <p:spPr>
+          <a:xfrm flipV="1">
+            <a:off x="4650050" y="3653715"/>
+            <a:ext cx="1720603" cy="867004"/>
+          </a:xfrm>
+          <a:prstGeom prst="straightConnector1">
+            <a:avLst/>
+          </a:prstGeom>
+          <a:ln w="28575" cmpd="sng">
+            <a:headEnd type="arrow"/>
+            <a:tailEnd type="none"/>
+          </a:ln>
+        </p:spPr>
+        <p:style>
+          <a:lnRef idx="1">
+            <a:schemeClr val="dk1"/>
+          </a:lnRef>
+          <a:fillRef idx="0">
+            <a:schemeClr val="dk1"/>
+          </a:fillRef>
+          <a:effectRef idx="0">
+            <a:schemeClr val="dk1"/>
+          </a:effectRef>
+          <a:fontRef idx="minor">
+            <a:schemeClr val="tx1"/>
+          </a:fontRef>
+        </p:style>
+      </p:cxnSp>
+      <p:cxnSp>
+        <p:nvCxnSpPr>
+          <p:cNvPr id="15" name="直线箭头连接符 14"/>
+          <p:cNvCxnSpPr/>
+          <p:nvPr/>
+        </p:nvCxnSpPr>
+        <p:spPr>
+          <a:xfrm flipH="1" flipV="1">
+            <a:off x="2299738" y="3577692"/>
+            <a:ext cx="1262684" cy="1166102"/>
+          </a:xfrm>
+          <a:prstGeom prst="straightConnector1">
+            <a:avLst/>
+          </a:prstGeom>
+          <a:ln w="28575" cmpd="sng">
+            <a:headEnd type="none"/>
+            <a:tailEnd type="arrow"/>
+          </a:ln>
+        </p:spPr>
+        <p:style>
+          <a:lnRef idx="1">
+            <a:schemeClr val="dk1"/>
+          </a:lnRef>
+          <a:fillRef idx="0">
+            <a:schemeClr val="dk1"/>
+          </a:fillRef>
+          <a:effectRef idx="0">
+            <a:schemeClr val="dk1"/>
+          </a:effectRef>
+          <a:fontRef idx="minor">
+            <a:schemeClr val="tx1"/>
+          </a:fontRef>
+        </p:style>
+      </p:cxnSp>
+      <p:sp>
+        <p:nvSpPr>
+          <p:cNvPr id="22" name="文本框 21"/>
+          <p:cNvSpPr txBox="1"/>
+          <p:nvPr/>
+        </p:nvSpPr>
+        <p:spPr>
+          <a:xfrm>
+            <a:off x="6978884" y="2702790"/>
+            <a:ext cx="1082348" cy="307777"/>
+          </a:xfrm>
+          <a:prstGeom prst="rect">
+            <a:avLst/>
+          </a:prstGeom>
+          <a:noFill/>
+        </p:spPr>
+        <p:txBody>
+          <a:bodyPr wrap="none" rtlCol="0">
+            <a:spAutoFit/>
+          </a:bodyPr>
+          <a:lstStyle/>
+          <a:p>
+            <a:r>
+              <a:rPr kumimoji="1" lang="zh-CN" altLang="en-US" sz="1400" dirty="0" smtClean="0">
+                <a:latin typeface="Hei"/>
+                <a:ea typeface="Hei"/>
+                <a:cs typeface="Hei"/>
+              </a:rPr>
+              <a:t>业务数据库</a:t>
+            </a:r>
+            <a:endParaRPr kumimoji="1" lang="zh-CN" altLang="en-US" sz="1400" dirty="0">
+              <a:latin typeface="Hei"/>
+              <a:ea typeface="Hei"/>
+              <a:cs typeface="Hei"/>
+            </a:endParaRPr>
+          </a:p>
+        </p:txBody>
+      </p:sp>
+      <p:sp>
+        <p:nvSpPr>
+          <p:cNvPr id="23" name="文本框 22"/>
+          <p:cNvSpPr txBox="1"/>
+          <p:nvPr/>
+        </p:nvSpPr>
+        <p:spPr>
+          <a:xfrm>
+            <a:off x="5651047" y="3269914"/>
+            <a:ext cx="1082348" cy="307777"/>
+          </a:xfrm>
+          <a:prstGeom prst="rect">
+            <a:avLst/>
+          </a:prstGeom>
+          <a:noFill/>
+        </p:spPr>
+        <p:txBody>
+          <a:bodyPr wrap="none" rtlCol="0">
+            <a:spAutoFit/>
+          </a:bodyPr>
+          <a:lstStyle/>
+          <a:p>
+            <a:r>
+              <a:rPr kumimoji="1" lang="zh-CN" altLang="en-US" sz="1400" dirty="0" smtClean="0">
+                <a:latin typeface="Hei"/>
+                <a:ea typeface="Hei"/>
+                <a:cs typeface="Hei"/>
+              </a:rPr>
+              <a:t>业务服务器</a:t>
+            </a:r>
+            <a:endParaRPr kumimoji="1" lang="zh-CN" altLang="en-US" sz="1400" dirty="0">
+              <a:latin typeface="Hei"/>
+              <a:ea typeface="Hei"/>
+              <a:cs typeface="Hei"/>
+            </a:endParaRPr>
+          </a:p>
+        </p:txBody>
+      </p:sp>
+      <p:sp>
+        <p:nvSpPr>
+          <p:cNvPr id="24" name="文本框 23"/>
+          <p:cNvSpPr txBox="1"/>
+          <p:nvPr/>
+        </p:nvSpPr>
+        <p:spPr>
+          <a:xfrm>
+            <a:off x="5229917" y="6047170"/>
+            <a:ext cx="1082348" cy="307777"/>
+          </a:xfrm>
+          <a:prstGeom prst="rect">
+            <a:avLst/>
+          </a:prstGeom>
+          <a:noFill/>
+        </p:spPr>
+        <p:txBody>
+          <a:bodyPr wrap="none" rtlCol="0">
+            <a:spAutoFit/>
+          </a:bodyPr>
+          <a:lstStyle/>
+          <a:p>
+            <a:r>
+              <a:rPr kumimoji="1" lang="zh-CN" altLang="en-US" sz="1400" dirty="0" smtClean="0">
+                <a:latin typeface="Hei"/>
+                <a:ea typeface="Hei"/>
+                <a:cs typeface="Hei"/>
+              </a:rPr>
+              <a:t>桌面客户端</a:t>
+            </a:r>
+            <a:endParaRPr kumimoji="1" lang="zh-CN" altLang="en-US" sz="1400" dirty="0">
+              <a:latin typeface="Hei"/>
+              <a:ea typeface="Hei"/>
+              <a:cs typeface="Hei"/>
+            </a:endParaRPr>
+          </a:p>
+        </p:txBody>
+      </p:sp>
+      <p:sp>
+        <p:nvSpPr>
+          <p:cNvPr id="25" name="文本框 24"/>
+          <p:cNvSpPr txBox="1"/>
+          <p:nvPr/>
+        </p:nvSpPr>
+        <p:spPr>
+          <a:xfrm>
+            <a:off x="3562422" y="5930189"/>
+            <a:ext cx="1082348" cy="307777"/>
+          </a:xfrm>
+          <a:prstGeom prst="rect">
+            <a:avLst/>
+          </a:prstGeom>
+          <a:noFill/>
+        </p:spPr>
+        <p:txBody>
+          <a:bodyPr wrap="none" rtlCol="0">
+            <a:spAutoFit/>
+          </a:bodyPr>
+          <a:lstStyle/>
+          <a:p>
+            <a:r>
+              <a:rPr kumimoji="1" lang="zh-CN" altLang="en-US" sz="1400" dirty="0" smtClean="0">
+                <a:latin typeface="Hei"/>
+                <a:ea typeface="Hei"/>
+                <a:cs typeface="Hei"/>
+              </a:rPr>
+              <a:t>移动客户端</a:t>
+            </a:r>
+            <a:endParaRPr kumimoji="1" lang="zh-CN" altLang="en-US" sz="1400" dirty="0">
+              <a:latin typeface="Hei"/>
+              <a:ea typeface="Hei"/>
+              <a:cs typeface="Hei"/>
+            </a:endParaRPr>
+          </a:p>
+        </p:txBody>
+      </p:sp>
+      <p:sp>
+        <p:nvSpPr>
+          <p:cNvPr id="28" name="文本框 27"/>
+          <p:cNvSpPr txBox="1"/>
+          <p:nvPr/>
+        </p:nvSpPr>
+        <p:spPr>
+          <a:xfrm>
+            <a:off x="2833866" y="3564366"/>
+            <a:ext cx="1457112" cy="523220"/>
+          </a:xfrm>
+          <a:prstGeom prst="rect">
+            <a:avLst/>
+          </a:prstGeom>
+          <a:noFill/>
+        </p:spPr>
+        <p:txBody>
+          <a:bodyPr wrap="none" rtlCol="0">
+            <a:spAutoFit/>
+          </a:bodyPr>
+          <a:lstStyle/>
+          <a:p>
+            <a:r>
+              <a:rPr kumimoji="1" lang="en-US" altLang="zh-CN" sz="1400" dirty="0" smtClean="0">
+                <a:latin typeface="Hei"/>
+                <a:ea typeface="Hei"/>
+                <a:cs typeface="Hei"/>
+              </a:rPr>
+              <a:t>3.</a:t>
+            </a:r>
+            <a:r>
+              <a:rPr kumimoji="1" lang="zh-CN" altLang="en-US" sz="1400" dirty="0" smtClean="0">
+                <a:latin typeface="Hei"/>
+                <a:ea typeface="Hei"/>
+                <a:cs typeface="Hei"/>
+              </a:rPr>
+              <a:t> 使用</a:t>
+            </a:r>
+            <a:r>
+              <a:rPr kumimoji="1" lang="zh-CN" altLang="en-US" sz="1400" dirty="0" smtClean="0">
+                <a:latin typeface="Hei"/>
+                <a:ea typeface="Hei"/>
+                <a:cs typeface="Hei"/>
+              </a:rPr>
+              <a:t>上传</a:t>
+            </a:r>
+            <a:r>
+              <a:rPr kumimoji="1" lang="zh-CN" altLang="en-US" sz="1400" dirty="0" smtClean="0">
+                <a:latin typeface="Hei"/>
+                <a:ea typeface="Hei"/>
+                <a:cs typeface="Hei"/>
+              </a:rPr>
+              <a:t>凭证</a:t>
+            </a:r>
+            <a:endParaRPr kumimoji="1" lang="en-US" altLang="zh-CN" sz="1400" dirty="0" smtClean="0">
+              <a:latin typeface="Hei"/>
+              <a:ea typeface="Hei"/>
+              <a:cs typeface="Hei"/>
+            </a:endParaRPr>
+          </a:p>
+          <a:p>
+            <a:r>
+              <a:rPr kumimoji="1" lang="zh-CN" altLang="en-US" sz="1400" dirty="0" smtClean="0">
+                <a:latin typeface="Hei"/>
+                <a:ea typeface="Hei"/>
+                <a:cs typeface="Hei"/>
+              </a:rPr>
+              <a:t>上传文件</a:t>
+            </a:r>
+            <a:endParaRPr kumimoji="1" lang="zh-CN" altLang="en-US" sz="1400" dirty="0">
+              <a:latin typeface="Hei"/>
+              <a:ea typeface="Hei"/>
+              <a:cs typeface="Hei"/>
+            </a:endParaRPr>
+          </a:p>
+        </p:txBody>
+      </p:sp>
+      <p:sp>
+        <p:nvSpPr>
+          <p:cNvPr id="29" name="文本框 28"/>
+          <p:cNvSpPr txBox="1"/>
+          <p:nvPr/>
+        </p:nvSpPr>
+        <p:spPr>
+          <a:xfrm>
+            <a:off x="4501317" y="3731579"/>
+            <a:ext cx="1457200" cy="307777"/>
+          </a:xfrm>
+          <a:prstGeom prst="rect">
+            <a:avLst/>
+          </a:prstGeom>
+          <a:noFill/>
+        </p:spPr>
+        <p:txBody>
+          <a:bodyPr wrap="none" rtlCol="0">
+            <a:spAutoFit/>
+          </a:bodyPr>
+          <a:lstStyle/>
+          <a:p>
+            <a:r>
+              <a:rPr kumimoji="1" lang="en-US" altLang="zh-CN" sz="1400" dirty="0" smtClean="0">
+                <a:latin typeface="Hei"/>
+                <a:ea typeface="Hei"/>
+                <a:cs typeface="Hei"/>
+              </a:rPr>
+              <a:t>2.</a:t>
+            </a:r>
+            <a:r>
+              <a:rPr kumimoji="1" lang="zh-CN" altLang="en-US" sz="1400" dirty="0" smtClean="0">
+                <a:latin typeface="Hei"/>
+                <a:ea typeface="Hei"/>
+                <a:cs typeface="Hei"/>
+              </a:rPr>
+              <a:t> 返回上传凭证</a:t>
+            </a:r>
+            <a:endParaRPr kumimoji="1" lang="zh-CN" altLang="en-US" sz="1400" dirty="0">
+              <a:latin typeface="Hei"/>
+              <a:ea typeface="Hei"/>
+              <a:cs typeface="Hei"/>
+            </a:endParaRPr>
+          </a:p>
+        </p:txBody>
+      </p:sp>
+      <p:cxnSp>
+        <p:nvCxnSpPr>
+          <p:cNvPr id="38" name="直线箭头连接符 12"/>
+          <p:cNvCxnSpPr/>
+          <p:nvPr/>
+        </p:nvCxnSpPr>
+        <p:spPr>
+          <a:xfrm flipV="1">
+            <a:off x="6499801" y="2456597"/>
+            <a:ext cx="860605" cy="246193"/>
+          </a:xfrm>
+          <a:prstGeom prst="straightConnector1">
+            <a:avLst/>
+          </a:prstGeom>
+          <a:ln w="28575" cmpd="sng">
+            <a:headEnd type="arrow"/>
+            <a:tailEnd type="arrow"/>
+          </a:ln>
+        </p:spPr>
+        <p:style>
+          <a:lnRef idx="1">
+            <a:schemeClr val="dk1"/>
+          </a:lnRef>
+          <a:fillRef idx="0">
+            <a:schemeClr val="dk1"/>
+          </a:fillRef>
+          <a:effectRef idx="0">
+            <a:schemeClr val="dk1"/>
+          </a:effectRef>
+          <a:fontRef idx="minor">
+            <a:schemeClr val="tx1"/>
+          </a:fontRef>
+        </p:style>
+      </p:cxnSp>
+      <p:pic>
+        <p:nvPicPr>
+          <p:cNvPr id="9" name="图片 8"/>
+          <p:cNvPicPr>
+            <a:picLocks noChangeAspect="1"/>
+          </p:cNvPicPr>
+          <p:nvPr/>
+        </p:nvPicPr>
+        <p:blipFill rotWithShape="1">
+          <a:blip r:embed="rId4"/>
+          <a:srcRect b="8721"/>
+          <a:stretch/>
+        </p:blipFill>
+        <p:spPr>
+          <a:xfrm>
+            <a:off x="5099321" y="4822813"/>
+            <a:ext cx="1341338" cy="1224357"/>
+          </a:xfrm>
+          <a:prstGeom prst="rect">
+            <a:avLst/>
+          </a:prstGeom>
+        </p:spPr>
+      </p:pic>
+      <p:cxnSp>
+        <p:nvCxnSpPr>
+          <p:cNvPr id="20" name="直线箭头连接符 19"/>
+          <p:cNvCxnSpPr/>
+          <p:nvPr/>
+        </p:nvCxnSpPr>
+        <p:spPr>
+          <a:xfrm flipV="1">
+            <a:off x="5012792" y="3666217"/>
+            <a:ext cx="1720603" cy="867004"/>
+          </a:xfrm>
+          <a:prstGeom prst="straightConnector1">
+            <a:avLst/>
+          </a:prstGeom>
+          <a:ln w="28575" cmpd="sng">
+            <a:headEnd type="none"/>
+            <a:tailEnd type="arrow"/>
+          </a:ln>
+        </p:spPr>
+        <p:style>
+          <a:lnRef idx="1">
+            <a:schemeClr val="dk1"/>
+          </a:lnRef>
+          <a:fillRef idx="0">
+            <a:schemeClr val="dk1"/>
+          </a:fillRef>
+          <a:effectRef idx="0">
+            <a:schemeClr val="dk1"/>
+          </a:effectRef>
+          <a:fontRef idx="minor">
+            <a:schemeClr val="tx1"/>
+          </a:fontRef>
+        </p:style>
+      </p:cxnSp>
+      <p:sp>
+        <p:nvSpPr>
+          <p:cNvPr id="21" name="文本框 20"/>
+          <p:cNvSpPr txBox="1"/>
+          <p:nvPr/>
+        </p:nvSpPr>
+        <p:spPr>
+          <a:xfrm>
+            <a:off x="6031137" y="4067293"/>
+            <a:ext cx="1457112" cy="307777"/>
+          </a:xfrm>
+          <a:prstGeom prst="rect">
+            <a:avLst/>
+          </a:prstGeom>
+          <a:noFill/>
+        </p:spPr>
+        <p:txBody>
+          <a:bodyPr wrap="none" rtlCol="0">
+            <a:spAutoFit/>
+          </a:bodyPr>
+          <a:lstStyle/>
+          <a:p>
+            <a:r>
+              <a:rPr kumimoji="1" lang="en-US" altLang="zh-CN" sz="1400" dirty="0" smtClean="0">
+                <a:latin typeface="Hei"/>
+                <a:ea typeface="Hei"/>
+                <a:cs typeface="Hei"/>
+              </a:rPr>
+              <a:t>1. </a:t>
+            </a:r>
+            <a:r>
+              <a:rPr kumimoji="1" lang="zh-CN" altLang="en-US" sz="1400" dirty="0" smtClean="0">
+                <a:latin typeface="Hei"/>
+                <a:ea typeface="Hei"/>
+                <a:cs typeface="Hei"/>
+              </a:rPr>
+              <a:t>申请上传授权</a:t>
+            </a:r>
+            <a:endParaRPr kumimoji="1" lang="zh-CN" altLang="en-US" sz="1400" dirty="0">
+              <a:latin typeface="Hei"/>
+              <a:ea typeface="Hei"/>
+              <a:cs typeface="Hei"/>
+            </a:endParaRPr>
+          </a:p>
+        </p:txBody>
+      </p:sp>
+      <p:cxnSp>
+        <p:nvCxnSpPr>
+          <p:cNvPr id="26" name="直线箭头连接符 25"/>
+          <p:cNvCxnSpPr>
+            <a:endCxn id="8" idx="1"/>
+          </p:cNvCxnSpPr>
+          <p:nvPr/>
+        </p:nvCxnSpPr>
+        <p:spPr>
+          <a:xfrm>
+            <a:off x="2039589" y="3653715"/>
+            <a:ext cx="1313188" cy="1181033"/>
+          </a:xfrm>
+          <a:prstGeom prst="straightConnector1">
+            <a:avLst/>
+          </a:prstGeom>
+          <a:ln w="28575" cmpd="sng">
+            <a:headEnd type="none"/>
+            <a:tailEnd type="arrow"/>
+          </a:ln>
+        </p:spPr>
+        <p:style>
+          <a:lnRef idx="1">
+            <a:schemeClr val="dk1"/>
+          </a:lnRef>
+          <a:fillRef idx="0">
+            <a:schemeClr val="dk1"/>
+          </a:fillRef>
+          <a:effectRef idx="0">
+            <a:schemeClr val="dk1"/>
+          </a:effectRef>
+          <a:fontRef idx="minor">
+            <a:schemeClr val="tx1"/>
+          </a:fontRef>
+        </p:style>
+      </p:cxnSp>
+      <p:sp>
+        <p:nvSpPr>
+          <p:cNvPr id="27" name="文本框 26"/>
+          <p:cNvSpPr txBox="1"/>
+          <p:nvPr/>
+        </p:nvSpPr>
+        <p:spPr>
+          <a:xfrm>
+            <a:off x="1208065" y="4156846"/>
+            <a:ext cx="1457200" cy="307777"/>
+          </a:xfrm>
+          <a:prstGeom prst="rect">
+            <a:avLst/>
+          </a:prstGeom>
+          <a:noFill/>
+        </p:spPr>
+        <p:txBody>
+          <a:bodyPr wrap="none" rtlCol="0">
+            <a:spAutoFit/>
+          </a:bodyPr>
+          <a:lstStyle/>
+          <a:p>
+            <a:r>
+              <a:rPr kumimoji="1" lang="en-US" altLang="zh-CN" sz="1400" dirty="0" smtClean="0">
+                <a:latin typeface="Hei"/>
+                <a:ea typeface="Hei"/>
+                <a:cs typeface="Hei"/>
+              </a:rPr>
+              <a:t>6.</a:t>
+            </a:r>
+            <a:r>
+              <a:rPr kumimoji="1" lang="zh-CN" altLang="en-US" sz="1400" dirty="0" smtClean="0">
+                <a:latin typeface="Hei"/>
+                <a:ea typeface="Hei"/>
+                <a:cs typeface="Hei"/>
+              </a:rPr>
+              <a:t> 返回</a:t>
+            </a:r>
+            <a:r>
+              <a:rPr kumimoji="1" lang="zh-CN" altLang="en-US" sz="1400" dirty="0" smtClean="0">
+                <a:latin typeface="Hei"/>
+                <a:ea typeface="Hei"/>
+                <a:cs typeface="Hei"/>
+              </a:rPr>
+              <a:t>上传</a:t>
+            </a:r>
+            <a:r>
+              <a:rPr kumimoji="1" lang="zh-CN" altLang="en-US" sz="1400" dirty="0" smtClean="0">
+                <a:latin typeface="Hei"/>
+                <a:ea typeface="Hei"/>
+                <a:cs typeface="Hei"/>
+              </a:rPr>
+              <a:t>结果</a:t>
+            </a:r>
+            <a:endParaRPr kumimoji="1" lang="zh-CN" altLang="en-US" sz="1400" dirty="0">
+              <a:latin typeface="Hei"/>
+              <a:ea typeface="Hei"/>
+              <a:cs typeface="Hei"/>
+            </a:endParaRPr>
+          </a:p>
+        </p:txBody>
+      </p:sp>
+      <p:cxnSp>
+        <p:nvCxnSpPr>
+          <p:cNvPr id="30" name="直线箭头连接符 29"/>
+          <p:cNvCxnSpPr/>
+          <p:nvPr/>
+        </p:nvCxnSpPr>
+        <p:spPr>
+          <a:xfrm flipH="1">
+            <a:off x="3562422" y="2915442"/>
+            <a:ext cx="1163798" cy="0"/>
+          </a:xfrm>
+          <a:prstGeom prst="straightConnector1">
+            <a:avLst/>
+          </a:prstGeom>
+          <a:ln w="28575" cmpd="sng">
+            <a:headEnd type="none"/>
+            <a:tailEnd type="arrow"/>
+          </a:ln>
+        </p:spPr>
+        <p:style>
+          <a:lnRef idx="1">
+            <a:schemeClr val="dk1"/>
+          </a:lnRef>
+          <a:fillRef idx="0">
+            <a:schemeClr val="dk1"/>
+          </a:fillRef>
+          <a:effectRef idx="0">
+            <a:schemeClr val="dk1"/>
+          </a:effectRef>
+          <a:fontRef idx="minor">
+            <a:schemeClr val="tx1"/>
+          </a:fontRef>
+        </p:style>
+      </p:cxnSp>
+      <p:cxnSp>
+        <p:nvCxnSpPr>
+          <p:cNvPr id="31" name="直线箭头连接符 30"/>
+          <p:cNvCxnSpPr/>
+          <p:nvPr/>
+        </p:nvCxnSpPr>
+        <p:spPr>
+          <a:xfrm>
+            <a:off x="3603866" y="2229960"/>
+            <a:ext cx="1190541" cy="0"/>
+          </a:xfrm>
+          <a:prstGeom prst="straightConnector1">
+            <a:avLst/>
+          </a:prstGeom>
+          <a:ln w="28575" cmpd="sng">
+            <a:headEnd type="none"/>
+            <a:tailEnd type="arrow"/>
+          </a:ln>
+        </p:spPr>
+        <p:style>
+          <a:lnRef idx="1">
+            <a:schemeClr val="dk1"/>
+          </a:lnRef>
+          <a:fillRef idx="0">
+            <a:schemeClr val="dk1"/>
+          </a:fillRef>
+          <a:effectRef idx="0">
+            <a:schemeClr val="dk1"/>
+          </a:effectRef>
+          <a:fontRef idx="minor">
+            <a:schemeClr val="tx1"/>
+          </a:fontRef>
+        </p:style>
+      </p:cxnSp>
+      <p:sp>
+        <p:nvSpPr>
+          <p:cNvPr id="32" name="文本框 31"/>
+          <p:cNvSpPr txBox="1"/>
+          <p:nvPr/>
+        </p:nvSpPr>
+        <p:spPr>
+          <a:xfrm>
+            <a:off x="3695390" y="1869315"/>
+            <a:ext cx="1100231" cy="307777"/>
+          </a:xfrm>
+          <a:prstGeom prst="rect">
+            <a:avLst/>
+          </a:prstGeom>
+          <a:noFill/>
+        </p:spPr>
+        <p:txBody>
+          <a:bodyPr wrap="none" rtlCol="0">
+            <a:spAutoFit/>
+          </a:bodyPr>
+          <a:lstStyle/>
+          <a:p>
+            <a:r>
+              <a:rPr kumimoji="1" lang="en-US" altLang="zh-CN" sz="1400" dirty="0" smtClean="0">
+                <a:latin typeface="Hei"/>
+                <a:ea typeface="Hei"/>
+                <a:cs typeface="Hei"/>
+              </a:rPr>
+              <a:t>4.</a:t>
+            </a:r>
+            <a:r>
+              <a:rPr kumimoji="1" lang="zh-CN" altLang="en-US" sz="1400" dirty="0" smtClean="0">
+                <a:latin typeface="Hei"/>
+                <a:ea typeface="Hei"/>
+                <a:cs typeface="Hei"/>
+              </a:rPr>
+              <a:t> 发起</a:t>
+            </a:r>
+            <a:r>
+              <a:rPr kumimoji="1" lang="zh-CN" altLang="en-US" sz="1400" dirty="0" smtClean="0">
+                <a:latin typeface="Hei"/>
+                <a:ea typeface="Hei"/>
+                <a:cs typeface="Hei"/>
+              </a:rPr>
+              <a:t>回调</a:t>
+            </a:r>
+            <a:endParaRPr kumimoji="1" lang="zh-CN" altLang="en-US" sz="1400" dirty="0">
+              <a:latin typeface="Hei"/>
+              <a:ea typeface="Hei"/>
+              <a:cs typeface="Hei"/>
+            </a:endParaRPr>
+          </a:p>
+        </p:txBody>
+      </p:sp>
+      <p:sp>
+        <p:nvSpPr>
+          <p:cNvPr id="33" name="文本框 32"/>
+          <p:cNvSpPr txBox="1"/>
+          <p:nvPr/>
+        </p:nvSpPr>
+        <p:spPr>
+          <a:xfrm>
+            <a:off x="3496786" y="2948037"/>
+            <a:ext cx="1457287" cy="307777"/>
+          </a:xfrm>
+          <a:prstGeom prst="rect">
+            <a:avLst/>
+          </a:prstGeom>
+          <a:noFill/>
+        </p:spPr>
+        <p:txBody>
+          <a:bodyPr wrap="none" rtlCol="0">
+            <a:spAutoFit/>
+          </a:bodyPr>
+          <a:lstStyle/>
+          <a:p>
+            <a:r>
+              <a:rPr kumimoji="1" lang="en-US" altLang="zh-CN" sz="1400" dirty="0" smtClean="0">
+                <a:latin typeface="Hei"/>
+                <a:ea typeface="Hei"/>
+                <a:cs typeface="Hei"/>
+              </a:rPr>
+              <a:t>5.</a:t>
+            </a:r>
+            <a:r>
+              <a:rPr kumimoji="1" lang="zh-CN" altLang="en-US" sz="1400" dirty="0" smtClean="0">
+                <a:latin typeface="Hei"/>
+                <a:ea typeface="Hei"/>
+                <a:cs typeface="Hei"/>
+              </a:rPr>
+              <a:t> 返回</a:t>
+            </a:r>
+            <a:r>
+              <a:rPr kumimoji="1" lang="zh-CN" altLang="en-US" sz="1400" dirty="0" smtClean="0">
+                <a:latin typeface="Hei"/>
+                <a:ea typeface="Hei"/>
+                <a:cs typeface="Hei"/>
+              </a:rPr>
+              <a:t>回调结果</a:t>
+            </a:r>
+            <a:endParaRPr kumimoji="1" lang="zh-CN" altLang="en-US" sz="1400" dirty="0">
+              <a:latin typeface="Hei"/>
+              <a:ea typeface="Hei"/>
+              <a:cs typeface="Hei"/>
+            </a:endParaRPr>
+          </a:p>
+        </p:txBody>
+      </p:sp>
+    </p:spTree>
+    <p:extLst>
+      <p:ext uri="{BB962C8B-B14F-4D97-AF65-F5344CB8AC3E}">
+        <p14:creationId xmlns:p14="http://schemas.microsoft.com/office/powerpoint/2010/main" val="2890113681"/>
       </p:ext>
     </p:extLst>
   </p:cSld>

</xml_diff>